<commit_message>
Updated final project presentation and report
</commit_message>
<xml_diff>
--- a/Final project presentation.pptx
+++ b/Final project presentation.pptx
@@ -18,7 +18,8 @@
     <p:sldId id="265" r:id="rId8"/>
     <p:sldId id="268" r:id="rId9"/>
     <p:sldId id="269" r:id="rId10"/>
-    <p:sldId id="266" r:id="rId11"/>
+    <p:sldId id="270" r:id="rId11"/>
+    <p:sldId id="266" r:id="rId12"/>
   </p:sldIdLst>
   <p:sldSz cx="12192000" cy="6858000"/>
   <p:notesSz cx="7023100" cy="9309100"/>
@@ -1343,6 +1344,106 @@
 </file>
 
 <file path=ppt/notesSlides/notesSlide8.xml><?xml version="1.0" encoding="utf-8"?>
+<p:notes xmlns:a="http://schemas.openxmlformats.org/drawingml/2006/main" xmlns:r="http://schemas.openxmlformats.org/officeDocument/2006/relationships" xmlns:p="http://schemas.openxmlformats.org/presentationml/2006/main">
+  <p:cSld>
+    <p:spTree>
+      <p:nvGrpSpPr>
+        <p:cNvPr id="1" name=""/>
+        <p:cNvGrpSpPr/>
+        <p:nvPr/>
+      </p:nvGrpSpPr>
+      <p:grpSpPr>
+        <a:xfrm>
+          <a:off x="0" y="0"/>
+          <a:ext cx="0" cy="0"/>
+          <a:chOff x="0" y="0"/>
+          <a:chExt cx="0" cy="0"/>
+        </a:xfrm>
+      </p:grpSpPr>
+      <p:sp>
+        <p:nvSpPr>
+          <p:cNvPr id="2" name="Slide Image Placeholder 1"/>
+          <p:cNvSpPr>
+            <a:spLocks noGrp="1" noRot="1" noChangeAspect="1" noEditPoints="1"/>
+          </p:cNvSpPr>
+          <p:nvPr>
+            <p:ph type="sldImg"/>
+          </p:nvPr>
+        </p:nvSpPr>
+        <p:spPr>
+          <a:xfrm>
+            <a:off x="718962" y="1163638"/>
+            <a:ext cx="5585176" cy="3141662"/>
+          </a:xfrm>
+          <a:prstGeom prst="rect">
+            <a:avLst/>
+          </a:prstGeom>
+        </p:spPr>
+        <p:txBody>
+          <a:bodyPr/>
+          <a:lstStyle/>
+          <a:p/>
+        </p:txBody>
+      </p:sp>
+      <p:sp>
+        <p:nvSpPr>
+          <p:cNvPr id="3" name="Text Placeholder 2"/>
+          <p:cNvSpPr>
+            <a:spLocks noGrp="1" noEditPoints="1"/>
+          </p:cNvSpPr>
+          <p:nvPr>
+            <p:ph type="body" idx="3"/>
+          </p:nvPr>
+        </p:nvSpPr>
+        <p:spPr>
+          <a:prstGeom prst="rect">
+            <a:avLst/>
+          </a:prstGeom>
+        </p:spPr>
+        <p:txBody>
+          <a:bodyPr/>
+          <a:lstStyle/>
+          <a:p>
+            <a:endParaRPr lang="en-US"/>
+          </a:p>
+        </p:txBody>
+      </p:sp>
+      <p:sp>
+        <p:nvSpPr>
+          <p:cNvPr id="4" name="Slide Number Placeholder 3"/>
+          <p:cNvSpPr>
+            <a:spLocks noGrp="1" noEditPoints="1"/>
+          </p:cNvSpPr>
+          <p:nvPr>
+            <p:ph type="sldNum" sz="quarter" idx="5"/>
+          </p:nvPr>
+        </p:nvSpPr>
+        <p:spPr>
+          <a:prstGeom prst="rect">
+            <a:avLst/>
+          </a:prstGeom>
+        </p:spPr>
+        <p:txBody>
+          <a:bodyPr/>
+          <a:lstStyle/>
+          <a:p>
+            <a:fld id="{68BC30A0-EFCA-4DA7-9C86-24E21C785494}" type="slidenum">
+              <a:rPr lang="en-US" smtClean="0"/>
+              <a:t>‹#›</a:t>
+            </a:fld>
+            <a:endParaRPr lang="en-US"/>
+          </a:p>
+        </p:txBody>
+      </p:sp>
+    </p:spTree>
+  </p:cSld>
+  <p:clrMapOvr>
+    <a:masterClrMapping/>
+  </p:clrMapOvr>
+</p:notes>
+</file>
+
+<file path=ppt/notesSlides/notesSlide9.xml><?xml version="1.0" encoding="utf-8"?>
 <p:notes xmlns:a="http://schemas.openxmlformats.org/drawingml/2006/main" xmlns:r="http://schemas.openxmlformats.org/officeDocument/2006/relationships" xmlns:p="http://schemas.openxmlformats.org/presentationml/2006/main">
   <p:cSld>
     <p:spTree>
@@ -8262,6 +8363,222 @@
 </file>
 
 <file path=ppt/slides/slide8.xml><?xml version="1.0" encoding="utf-8"?>
+<p:sld xmlns:a="http://schemas.openxmlformats.org/drawingml/2006/main" xmlns:r="http://schemas.openxmlformats.org/officeDocument/2006/relationships" xmlns:p="http://schemas.openxmlformats.org/presentationml/2006/main">
+  <p:cSld>
+    <p:spTree>
+      <p:nvGrpSpPr>
+        <p:cNvPr id="1" name=""/>
+        <p:cNvGrpSpPr/>
+        <p:nvPr/>
+      </p:nvGrpSpPr>
+      <p:grpSpPr>
+        <a:xfrm>
+          <a:off x="0" y="0"/>
+          <a:ext cx="0" cy="0"/>
+          <a:chOff x="0" y="0"/>
+          <a:chExt cx="0" cy="0"/>
+        </a:xfrm>
+      </p:grpSpPr>
+      <p:sp>
+        <p:nvSpPr>
+          <p:cNvPr id="2" name="Title 1"/>
+          <p:cNvSpPr>
+            <a:spLocks noGrp="1" noEditPoints="1"/>
+          </p:cNvSpPr>
+          <p:nvPr>
+            <p:ph type="title"/>
+          </p:nvPr>
+        </p:nvSpPr>
+        <p:spPr/>
+        <p:txBody>
+          <a:bodyPr/>
+          <a:lstStyle/>
+          <a:p>
+            <a:pPr algn="ctr"/>
+            <a:r>
+              <a:rPr lang="en">
+                <a:solidFill>
+                  <a:schemeClr val="bg2">
+                    <a:lumMod val="50000"/>
+                  </a:schemeClr>
+                </a:solidFill>
+              </a:rPr>
+              <a:t>Improvements for the ETL process</a:t>
+            </a:r>
+            <a:endParaRPr>
+              <a:solidFill>
+                <a:schemeClr val="bg2">
+                  <a:lumMod val="50000"/>
+                </a:schemeClr>
+              </a:solidFill>
+            </a:endParaRPr>
+          </a:p>
+        </p:txBody>
+      </p:sp>
+      <p:sp>
+        <p:nvSpPr>
+          <p:cNvPr id="3" name="Text Placeholder 2"/>
+          <p:cNvSpPr>
+            <a:spLocks noGrp="1" noEditPoints="1"/>
+          </p:cNvSpPr>
+          <p:nvPr>
+            <p:ph type="body" sz="half" idx="2"/>
+          </p:nvPr>
+        </p:nvSpPr>
+        <p:spPr/>
+        <p:txBody>
+          <a:bodyPr/>
+          <a:lstStyle/>
+          <a:p>
+            <a:pPr marL="0" marR="0" indent="0" algn="just">
+              <a:lnSpc>
+                <a:spcPct val="115000"/>
+              </a:lnSpc>
+              <a:spcBef>
+                <a:spcPts val="1200"/>
+              </a:spcBef>
+              <a:spcAft>
+                <a:spcPts val="1200"/>
+              </a:spcAft>
+            </a:pPr>
+            <a:r>
+              <a:rPr lang="en-US" sz="2000" b="1" i="1" u="none" strike="noStrike">
+                <a:solidFill>
+                  <a:schemeClr val="bg2">
+                    <a:lumMod val="50000"/>
+                  </a:schemeClr>
+                </a:solidFill>
+                <a:latin typeface="Times New Roman" pitchFamily="18" charset="0" panose="02020603050405020304"/>
+                <a:ea typeface="+mn-ea"/>
+                <a:cs typeface="Times New Roman" pitchFamily="18" charset="0" panose="02020603050405020304"/>
+              </a:rPr>
+              <a:t>Future improvement for ETL process</a:t>
+            </a:r>
+            <a:endParaRPr sz="2000" b="1" i="1" u="none" strike="noStrike">
+              <a:solidFill>
+                <a:schemeClr val="bg2">
+                  <a:lumMod val="50000"/>
+                </a:schemeClr>
+              </a:solidFill>
+              <a:latin typeface="Times New Roman" pitchFamily="18" charset="0" panose="02020603050405020304"/>
+              <a:ea typeface="+mn-ea"/>
+              <a:cs typeface="Times New Roman" pitchFamily="18" charset="0" panose="02020603050405020304"/>
+            </a:endParaRPr>
+          </a:p>
+          <a:p>
+            <a:pPr marL="571500" marR="0" indent="-342900" algn="just">
+              <a:lnSpc>
+                <a:spcPct val="115000"/>
+              </a:lnSpc>
+              <a:spcBef>
+                <a:spcPts val="1200"/>
+              </a:spcBef>
+              <a:spcAft>
+                <a:spcPts val="1200"/>
+              </a:spcAft>
+              <a:buSzPts val="1800"/>
+              <a:buFont typeface="Wingdings" pitchFamily="2" charset="2"/>
+              <a:buChar char="Ø"/>
+            </a:pPr>
+            <a:r>
+              <a:rPr lang="en-US" sz="2000" b="0" i="0" u="none" strike="noStrike">
+                <a:solidFill>
+                  <a:schemeClr val="bg2">
+                    <a:lumMod val="50000"/>
+                  </a:schemeClr>
+                </a:solidFill>
+                <a:latin typeface="Times New Roman" pitchFamily="18" charset="0" panose="02020603050405020304"/>
+                <a:ea typeface="+mn-ea"/>
+                <a:cs typeface="Times New Roman" pitchFamily="18" charset="0" panose="02020603050405020304"/>
+              </a:rPr>
+              <a:t>Focus more on improving ETL skills and google cloud interaction with postgres. </a:t>
+            </a:r>
+            <a:endParaRPr sz="2000" b="0" i="0" u="none" strike="noStrike">
+              <a:solidFill>
+                <a:schemeClr val="bg2">
+                  <a:lumMod val="50000"/>
+                </a:schemeClr>
+              </a:solidFill>
+              <a:latin typeface="Times New Roman" pitchFamily="18" charset="0" panose="02020603050405020304"/>
+              <a:ea typeface="+mn-ea"/>
+              <a:cs typeface="Times New Roman" pitchFamily="18" charset="0" panose="02020603050405020304"/>
+            </a:endParaRPr>
+          </a:p>
+          <a:p>
+            <a:pPr marL="571500" marR="0" indent="-342900" algn="just">
+              <a:lnSpc>
+                <a:spcPct val="115000"/>
+              </a:lnSpc>
+              <a:spcBef>
+                <a:spcPts val="1200"/>
+              </a:spcBef>
+              <a:spcAft>
+                <a:spcPts val="1200"/>
+              </a:spcAft>
+              <a:buSzPts val="1800"/>
+              <a:buFont typeface="Wingdings" pitchFamily="2" charset="2"/>
+              <a:buChar char="Ø"/>
+            </a:pPr>
+            <a:r>
+              <a:rPr lang="en-US" sz="2000" b="0" i="0" u="none" strike="noStrike">
+                <a:solidFill>
+                  <a:schemeClr val="bg2">
+                    <a:lumMod val="50000"/>
+                  </a:schemeClr>
+                </a:solidFill>
+                <a:latin typeface="Times New Roman" pitchFamily="18" charset="0" panose="02020603050405020304"/>
+                <a:ea typeface="+mn-ea"/>
+                <a:cs typeface="Times New Roman" pitchFamily="18" charset="0" panose="02020603050405020304"/>
+              </a:rPr>
+              <a:t>Review of big query and nginx</a:t>
+            </a:r>
+          </a:p>
+          <a:p>
+            <a:pPr marL="342900" marR="0" indent="-342900" algn="l">
+              <a:lnSpc>
+                <a:spcPct val="115000"/>
+              </a:lnSpc>
+              <a:spcBef>
+                <a:spcPts val="0"/>
+              </a:spcBef>
+              <a:spcAft>
+                <a:spcPts val="1000"/>
+              </a:spcAft>
+              <a:buFont typeface="Wingdings" pitchFamily="2" charset="2"/>
+              <a:buChar char="Ø"/>
+            </a:pPr>
+            <a:r>
+              <a:rPr lang="en-US" sz="2000" b="0" i="0" u="none" strike="noStrike">
+                <a:solidFill>
+                  <a:schemeClr val="bg2">
+                    <a:lumMod val="50000"/>
+                  </a:schemeClr>
+                </a:solidFill>
+                <a:latin typeface="Times New Roman" pitchFamily="18" charset="0" panose="02020603050405020304"/>
+                <a:ea typeface="+mn-ea"/>
+                <a:cs typeface="Times New Roman" pitchFamily="18" charset="0" panose="02020603050405020304"/>
+              </a:rPr>
+              <a:t>Build on the project and come up with a finalized working project with key insights, modeling &amp; evaluation and future recommendations in the dashboard. </a:t>
+            </a:r>
+            <a:endParaRPr sz="2000">
+              <a:solidFill>
+                <a:schemeClr val="bg2">
+                  <a:lumMod val="50000"/>
+                </a:schemeClr>
+              </a:solidFill>
+            </a:endParaRPr>
+          </a:p>
+        </p:txBody>
+      </p:sp>
+    </p:spTree>
+  </p:cSld>
+  <p:clrMapOvr>
+    <a:masterClrMapping/>
+  </p:clrMapOvr>
+</p:sld>
+</file>
+
+<file path=ppt/slides/slide9.xml><?xml version="1.0" encoding="utf-8"?>
 <p:sld xmlns:a="http://schemas.openxmlformats.org/drawingml/2006/main" xmlns:r="http://schemas.openxmlformats.org/officeDocument/2006/relationships" xmlns:p="http://schemas.openxmlformats.org/presentationml/2006/main">
   <p:cSld>
     <p:spTree>

</xml_diff>